<commit_message>
Updated slides and added notebook for multi gpus from scratch
</commit_message>
<xml_diff>
--- a/slides/Multi GPU and Distributed Training.pptx
+++ b/slides/Multi GPU and Distributed Training.pptx
@@ -5493,7 +5493,7 @@
             <a:fld id="{0B25AC41-3BEC-9247-8322-91B80C013F2D}" type="datetimeFigureOut">
               <a:rPr lang="en-US" smtClean="0"/>
               <a:pPr/>
-              <a:t>7/12/18</a:t>
+              <a:t>7/13/18</a:t>
             </a:fld>
             <a:endParaRPr lang="en-US" dirty="0"/>
           </a:p>
@@ -6002,7 +6002,15 @@
             </a:r>
             <a:r>
               <a:rPr lang="de-DE" dirty="0"/>
-              <a:t> so easy </a:t>
+              <a:t> </a:t>
+            </a:r>
+            <a:r>
+              <a:rPr lang="de-DE" dirty="0" err="1"/>
+              <a:t>easier</a:t>
+            </a:r>
+            <a:r>
+              <a:rPr lang="de-DE" dirty="0"/>
+              <a:t> </a:t>
             </a:r>
             <a:r>
               <a:rPr lang="de-DE" dirty="0" err="1"/>
@@ -6056,13 +6064,23 @@
               <a:rPr lang="de-DE" dirty="0" err="1"/>
               <a:t>SageMaker</a:t>
             </a:r>
+            <a:endParaRPr lang="de-DE" dirty="0"/>
+          </a:p>
+          <a:p>
+            <a:endParaRPr lang="de-DE" dirty="0"/>
+          </a:p>
+          <a:p>
+            <a:r>
+              <a:rPr lang="de-DE" dirty="0" err="1"/>
+              <a:t>Optimise</a:t>
+            </a:r>
             <a:r>
               <a:rPr lang="de-DE" dirty="0"/>
               <a:t> </a:t>
             </a:r>
             <a:r>
               <a:rPr lang="de-DE" dirty="0" err="1"/>
-              <a:t>this</a:t>
+              <a:t>early</a:t>
             </a:r>
             <a:r>
               <a:rPr lang="de-DE" dirty="0"/>
@@ -6070,7 +6088,7 @@
             </a:r>
             <a:r>
               <a:rPr lang="de-DE" dirty="0" err="1"/>
-              <a:t>has</a:t>
+              <a:t>to</a:t>
             </a:r>
             <a:r>
               <a:rPr lang="de-DE" dirty="0"/>
@@ -6078,20 +6096,7 @@
             </a:r>
             <a:r>
               <a:rPr lang="de-DE" dirty="0" err="1"/>
-              <a:t>changed</a:t>
-            </a:r>
-            <a:r>
-              <a:rPr lang="de-DE" dirty="0"/>
-              <a:t>.</a:t>
-            </a:r>
-          </a:p>
-          <a:p>
-            <a:endParaRPr lang="de-DE" dirty="0"/>
-          </a:p>
-          <a:p>
-            <a:r>
-              <a:rPr lang="de-DE" dirty="0" err="1"/>
-              <a:t>Optimise</a:t>
+              <a:t>become</a:t>
             </a:r>
             <a:r>
               <a:rPr lang="de-DE" dirty="0"/>
@@ -6099,7 +6104,7 @@
             </a:r>
             <a:r>
               <a:rPr lang="de-DE" dirty="0" err="1"/>
-              <a:t>early</a:t>
+              <a:t>more</a:t>
             </a:r>
             <a:r>
               <a:rPr lang="de-DE" dirty="0"/>
@@ -6107,152 +6112,11 @@
             </a:r>
             <a:r>
               <a:rPr lang="de-DE" dirty="0" err="1"/>
-              <a:t>to</a:t>
-            </a:r>
-            <a:r>
-              <a:rPr lang="de-DE" dirty="0"/>
-              <a:t> </a:t>
-            </a:r>
-            <a:r>
-              <a:rPr lang="de-DE" dirty="0" err="1"/>
-              <a:t>become</a:t>
-            </a:r>
-            <a:r>
-              <a:rPr lang="de-DE" dirty="0"/>
-              <a:t> </a:t>
-            </a:r>
-            <a:r>
-              <a:rPr lang="de-DE" dirty="0" err="1"/>
-              <a:t>more</a:t>
-            </a:r>
-            <a:r>
-              <a:rPr lang="de-DE" dirty="0"/>
-              <a:t> </a:t>
-            </a:r>
-            <a:r>
-              <a:rPr lang="de-DE" dirty="0" err="1"/>
               <a:t>productive</a:t>
             </a:r>
             <a:r>
               <a:rPr lang="de-DE" dirty="0"/>
               <a:t>. </a:t>
-            </a:r>
-          </a:p>
-          <a:p>
-            <a:endParaRPr lang="de-DE" dirty="0"/>
-          </a:p>
-          <a:p>
-            <a:r>
-              <a:rPr lang="de-DE" dirty="0" err="1"/>
-              <a:t>LSTNet</a:t>
-            </a:r>
-            <a:r>
-              <a:rPr lang="de-DE" dirty="0"/>
-              <a:t> on </a:t>
-            </a:r>
-            <a:r>
-              <a:rPr lang="de-DE" dirty="0" err="1"/>
-              <a:t>electricity.txt</a:t>
-            </a:r>
-            <a:r>
-              <a:rPr lang="de-DE" dirty="0"/>
-              <a:t> – I </a:t>
-            </a:r>
-            <a:r>
-              <a:rPr lang="de-DE" dirty="0" err="1"/>
-              <a:t>have</a:t>
-            </a:r>
-            <a:r>
-              <a:rPr lang="de-DE" dirty="0"/>
-              <a:t> </a:t>
-            </a:r>
-            <a:r>
-              <a:rPr lang="de-DE" dirty="0" err="1"/>
-              <a:t>run</a:t>
-            </a:r>
-            <a:r>
-              <a:rPr lang="de-DE" dirty="0"/>
-              <a:t> </a:t>
-            </a:r>
-            <a:r>
-              <a:rPr lang="de-DE" dirty="0" err="1"/>
-              <a:t>experiments</a:t>
-            </a:r>
-            <a:r>
-              <a:rPr lang="de-DE" dirty="0"/>
-              <a:t> </a:t>
-            </a:r>
-            <a:r>
-              <a:rPr lang="de-DE" dirty="0" err="1"/>
-              <a:t>that</a:t>
-            </a:r>
-            <a:r>
-              <a:rPr lang="de-DE" dirty="0"/>
-              <a:t> </a:t>
-            </a:r>
-            <a:r>
-              <a:rPr lang="de-DE" dirty="0" err="1"/>
-              <a:t>quickly</a:t>
-            </a:r>
-            <a:r>
-              <a:rPr lang="de-DE" dirty="0"/>
-              <a:t> </a:t>
-            </a:r>
-            <a:r>
-              <a:rPr lang="de-DE" dirty="0" err="1"/>
-              <a:t>get</a:t>
-            </a:r>
-            <a:r>
-              <a:rPr lang="de-DE" dirty="0"/>
-              <a:t> </a:t>
-            </a:r>
-            <a:r>
-              <a:rPr lang="de-DE" dirty="0" err="1"/>
-              <a:t>it</a:t>
-            </a:r>
-            <a:r>
-              <a:rPr lang="de-DE" dirty="0"/>
-              <a:t> down </a:t>
-            </a:r>
-            <a:r>
-              <a:rPr lang="de-DE" dirty="0" err="1"/>
-              <a:t>to</a:t>
-            </a:r>
-            <a:r>
-              <a:rPr lang="de-DE" dirty="0"/>
-              <a:t> </a:t>
-            </a:r>
-            <a:r>
-              <a:rPr lang="de-DE" dirty="0" err="1"/>
-              <a:t>under</a:t>
-            </a:r>
-            <a:r>
-              <a:rPr lang="de-DE" dirty="0"/>
-              <a:t> 10 </a:t>
-            </a:r>
-            <a:r>
-              <a:rPr lang="de-DE" dirty="0" err="1"/>
-              <a:t>minutes</a:t>
-            </a:r>
-            <a:r>
-              <a:rPr lang="de-DE" dirty="0"/>
-              <a:t> </a:t>
-            </a:r>
-            <a:r>
-              <a:rPr lang="de-DE" dirty="0" err="1"/>
-              <a:t>from</a:t>
-            </a:r>
-            <a:r>
-              <a:rPr lang="de-DE" dirty="0"/>
-              <a:t> 40 </a:t>
-            </a:r>
-            <a:r>
-              <a:rPr lang="de-DE" dirty="0" err="1"/>
-              <a:t>minutes</a:t>
-            </a:r>
-            <a:r>
-              <a:rPr lang="de-DE" dirty="0"/>
-              <a:t>.</a:t>
             </a:r>
           </a:p>
         </p:txBody>
@@ -16892,12 +16756,20 @@
           <a:lstStyle/>
           <a:p>
             <a:r>
+              <a:rPr lang="de-DE" sz="1400" dirty="0">
+                <a:latin typeface="Menlo" panose="020B0609030804020204" pitchFamily="49" charset="0"/>
+                <a:ea typeface="Menlo" panose="020B0609030804020204" pitchFamily="49" charset="0"/>
+                <a:cs typeface="Menlo" panose="020B0609030804020204" pitchFamily="49" charset="0"/>
+              </a:rPr>
+              <a:t>cd </a:t>
+            </a:r>
+            <a:r>
               <a:rPr lang="de-DE" sz="1400" dirty="0" err="1">
                 <a:latin typeface="Menlo" panose="020B0609030804020204" pitchFamily="49" charset="0"/>
                 <a:ea typeface="Menlo" panose="020B0609030804020204" pitchFamily="49" charset="0"/>
                 <a:cs typeface="Menlo" panose="020B0609030804020204" pitchFamily="49" charset="0"/>
               </a:rPr>
-              <a:t>python</a:t>
+              <a:t>labs</a:t>
             </a:r>
             <a:r>
               <a:rPr lang="de-DE" sz="1400" dirty="0">
@@ -16905,7 +16777,7 @@
                 <a:ea typeface="Menlo" panose="020B0609030804020204" pitchFamily="49" charset="0"/>
                 <a:cs typeface="Menlo" panose="020B0609030804020204" pitchFamily="49" charset="0"/>
               </a:rPr>
-              <a:t> </a:t>
+              <a:t>/</a:t>
             </a:r>
             <a:r>
               <a:rPr lang="de-DE" sz="1400" dirty="0" err="1">
@@ -16913,7 +16785,7 @@
                 <a:ea typeface="Menlo" panose="020B0609030804020204" pitchFamily="49" charset="0"/>
                 <a:cs typeface="Menlo" panose="020B0609030804020204" pitchFamily="49" charset="0"/>
               </a:rPr>
-              <a:t>start_scheduler.py</a:t>
+              <a:t>distributed_training_mxnet</a:t>
             </a:r>
             <a:r>
               <a:rPr lang="de-DE" sz="1400" dirty="0">
@@ -16921,73 +16793,130 @@
                 <a:ea typeface="Menlo" panose="020B0609030804020204" pitchFamily="49" charset="0"/>
                 <a:cs typeface="Menlo" panose="020B0609030804020204" pitchFamily="49" charset="0"/>
               </a:rPr>
-              <a:t> &amp;</a:t>
-            </a:r>
-          </a:p>
-          <a:p>
+              <a:t>/</a:t>
+            </a:r>
             <a:r>
               <a:rPr lang="de-DE" sz="1400" dirty="0" err="1">
                 <a:latin typeface="Menlo" panose="020B0609030804020204" pitchFamily="49" charset="0"/>
                 <a:ea typeface="Menlo" panose="020B0609030804020204" pitchFamily="49" charset="0"/>
                 <a:cs typeface="Menlo" panose="020B0609030804020204" pitchFamily="49" charset="0"/>
               </a:rPr>
-              <a:t>python</a:t>
-            </a:r>
-            <a:r>
-              <a:rPr lang="de-DE" sz="1400" dirty="0">
-                <a:latin typeface="Menlo" panose="020B0609030804020204" pitchFamily="49" charset="0"/>
-                <a:ea typeface="Menlo" panose="020B0609030804020204" pitchFamily="49" charset="0"/>
-                <a:cs typeface="Menlo" panose="020B0609030804020204" pitchFamily="49" charset="0"/>
-              </a:rPr>
-              <a:t> </a:t>
-            </a:r>
-            <a:r>
-              <a:rPr lang="de-DE" sz="1400" dirty="0" err="1">
-                <a:latin typeface="Menlo" panose="020B0609030804020204" pitchFamily="49" charset="0"/>
-                <a:ea typeface="Menlo" panose="020B0609030804020204" pitchFamily="49" charset="0"/>
-                <a:cs typeface="Menlo" panose="020B0609030804020204" pitchFamily="49" charset="0"/>
-              </a:rPr>
-              <a:t>start_server.py</a:t>
-            </a:r>
-            <a:r>
-              <a:rPr lang="de-DE" sz="1400" dirty="0">
-                <a:latin typeface="Menlo" panose="020B0609030804020204" pitchFamily="49" charset="0"/>
-                <a:ea typeface="Menlo" panose="020B0609030804020204" pitchFamily="49" charset="0"/>
-                <a:cs typeface="Menlo" panose="020B0609030804020204" pitchFamily="49" charset="0"/>
-              </a:rPr>
-              <a:t> &amp; </a:t>
-            </a:r>
-          </a:p>
-          <a:p>
-            <a:r>
-              <a:rPr lang="de-DE" sz="1400" dirty="0" err="1">
-                <a:latin typeface="Menlo" panose="020B0609030804020204" pitchFamily="49" charset="0"/>
-                <a:ea typeface="Menlo" panose="020B0609030804020204" pitchFamily="49" charset="0"/>
-                <a:cs typeface="Menlo" panose="020B0609030804020204" pitchFamily="49" charset="0"/>
-              </a:rPr>
-              <a:t>python</a:t>
-            </a:r>
-            <a:r>
-              <a:rPr lang="de-DE" sz="1400" dirty="0">
-                <a:latin typeface="Menlo" panose="020B0609030804020204" pitchFamily="49" charset="0"/>
-                <a:ea typeface="Menlo" panose="020B0609030804020204" pitchFamily="49" charset="0"/>
-                <a:cs typeface="Menlo" panose="020B0609030804020204" pitchFamily="49" charset="0"/>
-              </a:rPr>
-              <a:t> </a:t>
-            </a:r>
-            <a:r>
-              <a:rPr lang="de-DE" sz="1400" dirty="0" err="1">
-                <a:latin typeface="Menlo" panose="020B0609030804020204" pitchFamily="49" charset="0"/>
-                <a:ea typeface="Menlo" panose="020B0609030804020204" pitchFamily="49" charset="0"/>
-                <a:cs typeface="Menlo" panose="020B0609030804020204" pitchFamily="49" charset="0"/>
-              </a:rPr>
-              <a:t>start_worker.py</a:t>
+              <a:t>example_cluster</a:t>
             </a:r>
             <a:endParaRPr lang="de-DE" sz="1400" dirty="0">
               <a:latin typeface="Menlo" panose="020B0609030804020204" pitchFamily="49" charset="0"/>
               <a:ea typeface="Menlo" panose="020B0609030804020204" pitchFamily="49" charset="0"/>
               <a:cs typeface="Menlo" panose="020B0609030804020204" pitchFamily="49" charset="0"/>
             </a:endParaRPr>
+          </a:p>
+          <a:p>
+            <a:endParaRPr lang="de-DE" sz="1400" dirty="0">
+              <a:latin typeface="Menlo" panose="020B0609030804020204" pitchFamily="49" charset="0"/>
+              <a:ea typeface="Menlo" panose="020B0609030804020204" pitchFamily="49" charset="0"/>
+              <a:cs typeface="Menlo" panose="020B0609030804020204" pitchFamily="49" charset="0"/>
+            </a:endParaRPr>
+          </a:p>
+          <a:p>
+            <a:r>
+              <a:rPr lang="de-DE" sz="1400" dirty="0" err="1">
+                <a:latin typeface="Menlo" panose="020B0609030804020204" pitchFamily="49" charset="0"/>
+                <a:ea typeface="Menlo" panose="020B0609030804020204" pitchFamily="49" charset="0"/>
+                <a:cs typeface="Menlo" panose="020B0609030804020204" pitchFamily="49" charset="0"/>
+              </a:rPr>
+              <a:t>python</a:t>
+            </a:r>
+            <a:r>
+              <a:rPr lang="de-DE" sz="1400" dirty="0">
+                <a:latin typeface="Menlo" panose="020B0609030804020204" pitchFamily="49" charset="0"/>
+                <a:ea typeface="Menlo" panose="020B0609030804020204" pitchFamily="49" charset="0"/>
+                <a:cs typeface="Menlo" panose="020B0609030804020204" pitchFamily="49" charset="0"/>
+              </a:rPr>
+              <a:t> </a:t>
+            </a:r>
+            <a:r>
+              <a:rPr lang="de-DE" sz="1400" dirty="0" err="1">
+                <a:latin typeface="Menlo" panose="020B0609030804020204" pitchFamily="49" charset="0"/>
+                <a:ea typeface="Menlo" panose="020B0609030804020204" pitchFamily="49" charset="0"/>
+                <a:cs typeface="Menlo" panose="020B0609030804020204" pitchFamily="49" charset="0"/>
+              </a:rPr>
+              <a:t>start_scheduler.py</a:t>
+            </a:r>
+            <a:r>
+              <a:rPr lang="de-DE" sz="1400" dirty="0">
+                <a:latin typeface="Menlo" panose="020B0609030804020204" pitchFamily="49" charset="0"/>
+                <a:ea typeface="Menlo" panose="020B0609030804020204" pitchFamily="49" charset="0"/>
+                <a:cs typeface="Menlo" panose="020B0609030804020204" pitchFamily="49" charset="0"/>
+              </a:rPr>
+              <a:t> &amp;</a:t>
+            </a:r>
+          </a:p>
+          <a:p>
+            <a:r>
+              <a:rPr lang="de-DE" sz="1400" dirty="0" err="1">
+                <a:latin typeface="Menlo" panose="020B0609030804020204" pitchFamily="49" charset="0"/>
+                <a:ea typeface="Menlo" panose="020B0609030804020204" pitchFamily="49" charset="0"/>
+                <a:cs typeface="Menlo" panose="020B0609030804020204" pitchFamily="49" charset="0"/>
+              </a:rPr>
+              <a:t>python</a:t>
+            </a:r>
+            <a:r>
+              <a:rPr lang="de-DE" sz="1400" dirty="0">
+                <a:latin typeface="Menlo" panose="020B0609030804020204" pitchFamily="49" charset="0"/>
+                <a:ea typeface="Menlo" panose="020B0609030804020204" pitchFamily="49" charset="0"/>
+                <a:cs typeface="Menlo" panose="020B0609030804020204" pitchFamily="49" charset="0"/>
+              </a:rPr>
+              <a:t> </a:t>
+            </a:r>
+            <a:r>
+              <a:rPr lang="de-DE" sz="1400" dirty="0" err="1">
+                <a:latin typeface="Menlo" panose="020B0609030804020204" pitchFamily="49" charset="0"/>
+                <a:ea typeface="Menlo" panose="020B0609030804020204" pitchFamily="49" charset="0"/>
+                <a:cs typeface="Menlo" panose="020B0609030804020204" pitchFamily="49" charset="0"/>
+              </a:rPr>
+              <a:t>start_server.py</a:t>
+            </a:r>
+            <a:r>
+              <a:rPr lang="de-DE" sz="1400" dirty="0">
+                <a:latin typeface="Menlo" panose="020B0609030804020204" pitchFamily="49" charset="0"/>
+                <a:ea typeface="Menlo" panose="020B0609030804020204" pitchFamily="49" charset="0"/>
+                <a:cs typeface="Menlo" panose="020B0609030804020204" pitchFamily="49" charset="0"/>
+              </a:rPr>
+              <a:t> &amp; </a:t>
+            </a:r>
+          </a:p>
+          <a:p>
+            <a:r>
+              <a:rPr lang="de-DE" sz="1400" dirty="0" err="1">
+                <a:latin typeface="Menlo" panose="020B0609030804020204" pitchFamily="49" charset="0"/>
+                <a:ea typeface="Menlo" panose="020B0609030804020204" pitchFamily="49" charset="0"/>
+                <a:cs typeface="Menlo" panose="020B0609030804020204" pitchFamily="49" charset="0"/>
+              </a:rPr>
+              <a:t>python</a:t>
+            </a:r>
+            <a:r>
+              <a:rPr lang="de-DE" sz="1400" dirty="0">
+                <a:latin typeface="Menlo" panose="020B0609030804020204" pitchFamily="49" charset="0"/>
+                <a:ea typeface="Menlo" panose="020B0609030804020204" pitchFamily="49" charset="0"/>
+                <a:cs typeface="Menlo" panose="020B0609030804020204" pitchFamily="49" charset="0"/>
+              </a:rPr>
+              <a:t> </a:t>
+            </a:r>
+            <a:r>
+              <a:rPr lang="de-DE" sz="1400" dirty="0" err="1">
+                <a:latin typeface="Menlo" panose="020B0609030804020204" pitchFamily="49" charset="0"/>
+                <a:ea typeface="Menlo" panose="020B0609030804020204" pitchFamily="49" charset="0"/>
+                <a:cs typeface="Menlo" panose="020B0609030804020204" pitchFamily="49" charset="0"/>
+              </a:rPr>
+              <a:t>start_worker.py</a:t>
+            </a:r>
+            <a:r>
+              <a:rPr lang="de-DE" sz="1400" dirty="0">
+                <a:latin typeface="Menlo" panose="020B0609030804020204" pitchFamily="49" charset="0"/>
+                <a:ea typeface="Menlo" panose="020B0609030804020204" pitchFamily="49" charset="0"/>
+                <a:cs typeface="Menlo" panose="020B0609030804020204" pitchFamily="49" charset="0"/>
+              </a:rPr>
+              <a:t> &amp;</a:t>
+            </a:r>
           </a:p>
         </p:txBody>
       </p:sp>
@@ -32847,6 +32776,45 @@
             <a:r>
               <a:rPr lang="en-US" dirty="0"/>
               <a:t>Lab 4: Multiple GPUs from Scratch</a:t>
+            </a:r>
+          </a:p>
+        </p:txBody>
+      </p:sp>
+      <p:sp>
+        <p:nvSpPr>
+          <p:cNvPr id="2" name="TextBox 1">
+            <a:extLst>
+              <a:ext uri="{FF2B5EF4-FFF2-40B4-BE49-F238E27FC236}">
+                <a16:creationId xmlns:a16="http://schemas.microsoft.com/office/drawing/2014/main" id="{06DC232A-095E-E648-8B07-674A5DE086D3}"/>
+              </a:ext>
+            </a:extLst>
+          </p:cNvPr>
+          <p:cNvSpPr txBox="1"/>
+          <p:nvPr/>
+        </p:nvSpPr>
+        <p:spPr>
+          <a:xfrm>
+            <a:off x="396394" y="1784536"/>
+            <a:ext cx="1120820" cy="369332"/>
+          </a:xfrm>
+          <a:prstGeom prst="rect">
+            <a:avLst/>
+          </a:prstGeom>
+          <a:noFill/>
+        </p:spPr>
+        <p:txBody>
+          <a:bodyPr wrap="none" rtlCol="0">
+            <a:spAutoFit/>
+          </a:bodyPr>
+          <a:lstStyle/>
+          <a:p>
+            <a:r>
+              <a:rPr lang="de-DE" b="1" dirty="0">
+                <a:solidFill>
+                  <a:schemeClr val="bg1"/>
+                </a:solidFill>
+              </a:rPr>
+              <a:t>Optional</a:t>
             </a:r>
           </a:p>
         </p:txBody>
@@ -44983,21 +44951,6 @@
 </file>
 
 <file path=customXml/item1.xml><?xml version="1.0" encoding="utf-8"?>
-<?mso-contentType ?>
-<FormTemplates xmlns="http://schemas.microsoft.com/sharepoint/v3/contenttype/forms">
-  <Display>DocumentLibraryForm</Display>
-  <Edit>DocumentLibraryForm</Edit>
-  <New>DocumentLibraryForm</New>
-</FormTemplates>
-</file>
-
-<file path=customXml/item2.xml><?xml version="1.0" encoding="utf-8"?>
-<p:properties xmlns:p="http://schemas.microsoft.com/office/2006/metadata/properties" xmlns:xsi="http://www.w3.org/2001/XMLSchema-instance">
-  <documentManagement/>
-</p:properties>
-</file>
-
-<file path=customXml/item3.xml><?xml version="1.0" encoding="utf-8"?>
 <ct:contentTypeSchema xmlns:ct="http://schemas.microsoft.com/office/2006/metadata/contentType" xmlns:ma="http://schemas.microsoft.com/office/2006/metadata/properties/metaAttributes" ct:_="" ma:_="" ma:contentTypeName="Document" ma:contentTypeID="0x010100D26A3D6C04DFD740953BA1B2B9E62D60" ma:contentTypeVersion="0" ma:contentTypeDescription="Create a new document." ma:contentTypeScope="" ma:versionID="26617cd14cd3af163c0e97ff614e520a">
   <xsd:schema xmlns:xsd="http://www.w3.org/2001/XMLSchema" xmlns:xs="http://www.w3.org/2001/XMLSchema" xmlns:p="http://schemas.microsoft.com/office/2006/metadata/properties" targetNamespace="http://schemas.microsoft.com/office/2006/metadata/properties" ma:root="true" ma:fieldsID="c64490b4aec6201516c3a874156f37b2">
     <xsd:element name="properties">
@@ -45111,30 +45064,22 @@
 </ct:contentTypeSchema>
 </file>
 
-<file path=customXml/itemProps1.xml><?xml version="1.0" encoding="utf-8"?>
-<ds:datastoreItem xmlns:ds="http://schemas.openxmlformats.org/officeDocument/2006/customXml" ds:itemID="{705B35A6-8B52-46A5-AE45-B98C6459DC10}">
-  <ds:schemaRefs>
-    <ds:schemaRef ds:uri="http://schemas.microsoft.com/sharepoint/v3/contenttype/forms"/>
-  </ds:schemaRefs>
-</ds:datastoreItem>
+<file path=customXml/item2.xml><?xml version="1.0" encoding="utf-8"?>
+<?mso-contentType ?>
+<FormTemplates xmlns="http://schemas.microsoft.com/sharepoint/v3/contenttype/forms">
+  <Display>DocumentLibraryForm</Display>
+  <Edit>DocumentLibraryForm</Edit>
+  <New>DocumentLibraryForm</New>
+</FormTemplates>
 </file>
 
-<file path=customXml/itemProps2.xml><?xml version="1.0" encoding="utf-8"?>
-<ds:datastoreItem xmlns:ds="http://schemas.openxmlformats.org/officeDocument/2006/customXml" ds:itemID="{C597C89A-FD0C-431E-81F6-90225B937683}">
-  <ds:schemaRefs>
-    <ds:schemaRef ds:uri="http://schemas.microsoft.com/office/infopath/2007/PartnerControls"/>
-    <ds:schemaRef ds:uri="http://www.w3.org/XML/1998/namespace"/>
-    <ds:schemaRef ds:uri="http://schemas.microsoft.com/office/2006/documentManagement/types"/>
-    <ds:schemaRef ds:uri="http://purl.org/dc/dcmitype/"/>
-    <ds:schemaRef ds:uri="http://schemas.openxmlformats.org/package/2006/metadata/core-properties"/>
-    <ds:schemaRef ds:uri="http://purl.org/dc/terms/"/>
-    <ds:schemaRef ds:uri="http://schemas.microsoft.com/office/2006/metadata/properties"/>
-    <ds:schemaRef ds:uri="http://purl.org/dc/elements/1.1/"/>
-  </ds:schemaRefs>
-</ds:datastoreItem>
+<file path=customXml/item3.xml><?xml version="1.0" encoding="utf-8"?>
+<p:properties xmlns:p="http://schemas.microsoft.com/office/2006/metadata/properties" xmlns:xsi="http://www.w3.org/2001/XMLSchema-instance">
+  <documentManagement/>
+</p:properties>
 </file>
 
-<file path=customXml/itemProps3.xml><?xml version="1.0" encoding="utf-8"?>
+<file path=customXml/itemProps1.xml><?xml version="1.0" encoding="utf-8"?>
 <ds:datastoreItem xmlns:ds="http://schemas.openxmlformats.org/officeDocument/2006/customXml" ds:itemID="{51A3258A-222C-4488-825E-7520D001FB75}">
   <ds:schemaRefs>
     <ds:schemaRef ds:uri="http://schemas.microsoft.com/office/2006/metadata/contentType"/>
@@ -45148,4 +45093,27 @@
     <ds:schemaRef ds:uri="http://schemas.microsoft.com/office/infopath/2007/PartnerControls"/>
   </ds:schemaRefs>
 </ds:datastoreItem>
+</file>
+
+<file path=customXml/itemProps2.xml><?xml version="1.0" encoding="utf-8"?>
+<ds:datastoreItem xmlns:ds="http://schemas.openxmlformats.org/officeDocument/2006/customXml" ds:itemID="{705B35A6-8B52-46A5-AE45-B98C6459DC10}">
+  <ds:schemaRefs>
+    <ds:schemaRef ds:uri="http://schemas.microsoft.com/sharepoint/v3/contenttype/forms"/>
+  </ds:schemaRefs>
+</ds:datastoreItem>
+</file>
+
+<file path=customXml/itemProps3.xml><?xml version="1.0" encoding="utf-8"?>
+<ds:datastoreItem xmlns:ds="http://schemas.openxmlformats.org/officeDocument/2006/customXml" ds:itemID="{C597C89A-FD0C-431E-81F6-90225B937683}">
+  <ds:schemaRefs>
+    <ds:schemaRef ds:uri="http://schemas.microsoft.com/office/infopath/2007/PartnerControls"/>
+    <ds:schemaRef ds:uri="http://www.w3.org/XML/1998/namespace"/>
+    <ds:schemaRef ds:uri="http://schemas.microsoft.com/office/2006/documentManagement/types"/>
+    <ds:schemaRef ds:uri="http://purl.org/dc/dcmitype/"/>
+    <ds:schemaRef ds:uri="http://schemas.openxmlformats.org/package/2006/metadata/core-properties"/>
+    <ds:schemaRef ds:uri="http://purl.org/dc/terms/"/>
+    <ds:schemaRef ds:uri="http://schemas.microsoft.com/office/2006/metadata/properties"/>
+    <ds:schemaRef ds:uri="http://purl.org/dc/elements/1.1/"/>
+  </ds:schemaRefs>
+</ds:datastoreItem>
 </file>
</xml_diff>